<commit_message>
Complete: 1st team review
</commit_message>
<xml_diff>
--- a/figure/orbit_figure.pptx
+++ b/figure/orbit_figure.pptx
@@ -251,7 +251,7 @@
           <a:p>
             <a:fld id="{6D7DD953-1579-4DF7-AF33-EF8F1C352A10}" type="datetimeFigureOut">
               <a:rPr kumimoji="1" lang="ja-JP" altLang="en-US" smtClean="0"/>
-              <a:t>2020/3/26</a:t>
+              <a:t>2020/3/30</a:t>
             </a:fld>
             <a:endParaRPr kumimoji="1" lang="ja-JP" altLang="en-US"/>
           </a:p>
@@ -453,7 +453,7 @@
           <a:p>
             <a:fld id="{6D7DD953-1579-4DF7-AF33-EF8F1C352A10}" type="datetimeFigureOut">
               <a:rPr kumimoji="1" lang="ja-JP" altLang="en-US" smtClean="0"/>
-              <a:t>2020/3/26</a:t>
+              <a:t>2020/3/30</a:t>
             </a:fld>
             <a:endParaRPr kumimoji="1" lang="ja-JP" altLang="en-US"/>
           </a:p>
@@ -665,7 +665,7 @@
           <a:p>
             <a:fld id="{6D7DD953-1579-4DF7-AF33-EF8F1C352A10}" type="datetimeFigureOut">
               <a:rPr kumimoji="1" lang="ja-JP" altLang="en-US" smtClean="0"/>
-              <a:t>2020/3/26</a:t>
+              <a:t>2020/3/30</a:t>
             </a:fld>
             <a:endParaRPr kumimoji="1" lang="ja-JP" altLang="en-US"/>
           </a:p>
@@ -867,7 +867,7 @@
           <a:p>
             <a:fld id="{6D7DD953-1579-4DF7-AF33-EF8F1C352A10}" type="datetimeFigureOut">
               <a:rPr kumimoji="1" lang="ja-JP" altLang="en-US" smtClean="0"/>
-              <a:t>2020/3/26</a:t>
+              <a:t>2020/3/30</a:t>
             </a:fld>
             <a:endParaRPr kumimoji="1" lang="ja-JP" altLang="en-US"/>
           </a:p>
@@ -1111,7 +1111,7 @@
           <a:p>
             <a:fld id="{6D7DD953-1579-4DF7-AF33-EF8F1C352A10}" type="datetimeFigureOut">
               <a:rPr kumimoji="1" lang="ja-JP" altLang="en-US" smtClean="0"/>
-              <a:t>2020/3/26</a:t>
+              <a:t>2020/3/30</a:t>
             </a:fld>
             <a:endParaRPr kumimoji="1" lang="ja-JP" altLang="en-US"/>
           </a:p>
@@ -1407,7 +1407,7 @@
           <a:p>
             <a:fld id="{6D7DD953-1579-4DF7-AF33-EF8F1C352A10}" type="datetimeFigureOut">
               <a:rPr kumimoji="1" lang="ja-JP" altLang="en-US" smtClean="0"/>
-              <a:t>2020/3/26</a:t>
+              <a:t>2020/3/30</a:t>
             </a:fld>
             <a:endParaRPr kumimoji="1" lang="ja-JP" altLang="en-US"/>
           </a:p>
@@ -1838,7 +1838,7 @@
           <a:p>
             <a:fld id="{6D7DD953-1579-4DF7-AF33-EF8F1C352A10}" type="datetimeFigureOut">
               <a:rPr kumimoji="1" lang="ja-JP" altLang="en-US" smtClean="0"/>
-              <a:t>2020/3/26</a:t>
+              <a:t>2020/3/30</a:t>
             </a:fld>
             <a:endParaRPr kumimoji="1" lang="ja-JP" altLang="en-US"/>
           </a:p>
@@ -1956,7 +1956,7 @@
           <a:p>
             <a:fld id="{6D7DD953-1579-4DF7-AF33-EF8F1C352A10}" type="datetimeFigureOut">
               <a:rPr kumimoji="1" lang="ja-JP" altLang="en-US" smtClean="0"/>
-              <a:t>2020/3/26</a:t>
+              <a:t>2020/3/30</a:t>
             </a:fld>
             <a:endParaRPr kumimoji="1" lang="ja-JP" altLang="en-US"/>
           </a:p>
@@ -2051,7 +2051,7 @@
           <a:p>
             <a:fld id="{6D7DD953-1579-4DF7-AF33-EF8F1C352A10}" type="datetimeFigureOut">
               <a:rPr kumimoji="1" lang="ja-JP" altLang="en-US" smtClean="0"/>
-              <a:t>2020/3/26</a:t>
+              <a:t>2020/3/30</a:t>
             </a:fld>
             <a:endParaRPr kumimoji="1" lang="ja-JP" altLang="en-US"/>
           </a:p>
@@ -2360,7 +2360,7 @@
           <a:p>
             <a:fld id="{6D7DD953-1579-4DF7-AF33-EF8F1C352A10}" type="datetimeFigureOut">
               <a:rPr kumimoji="1" lang="ja-JP" altLang="en-US" smtClean="0"/>
-              <a:t>2020/3/26</a:t>
+              <a:t>2020/3/30</a:t>
             </a:fld>
             <a:endParaRPr kumimoji="1" lang="ja-JP" altLang="en-US"/>
           </a:p>
@@ -2617,7 +2617,7 @@
           <a:p>
             <a:fld id="{6D7DD953-1579-4DF7-AF33-EF8F1C352A10}" type="datetimeFigureOut">
               <a:rPr kumimoji="1" lang="ja-JP" altLang="en-US" smtClean="0"/>
-              <a:t>2020/3/26</a:t>
+              <a:t>2020/3/30</a:t>
             </a:fld>
             <a:endParaRPr kumimoji="1" lang="ja-JP" altLang="en-US"/>
           </a:p>
@@ -2862,7 +2862,7 @@
           <a:p>
             <a:fld id="{6D7DD953-1579-4DF7-AF33-EF8F1C352A10}" type="datetimeFigureOut">
               <a:rPr kumimoji="1" lang="ja-JP" altLang="en-US" smtClean="0"/>
-              <a:t>2020/3/26</a:t>
+              <a:t>2020/3/30</a:t>
             </a:fld>
             <a:endParaRPr kumimoji="1" lang="ja-JP" altLang="en-US"/>
           </a:p>
@@ -3281,7 +3281,7 @@
         </p:nvSpPr>
         <p:spPr>
           <a:xfrm>
-            <a:off x="1043332" y="4183602"/>
+            <a:off x="1177556" y="4225547"/>
             <a:ext cx="2022842" cy="1751332"/>
           </a:xfrm>
           <a:prstGeom prst="rect">
@@ -3355,7 +3355,7 @@
         </p:nvSpPr>
         <p:spPr>
           <a:xfrm>
-            <a:off x="759425" y="4006775"/>
+            <a:off x="893649" y="4048720"/>
             <a:ext cx="985129" cy="378043"/>
           </a:xfrm>
           <a:custGeom>
@@ -3505,7 +3505,7 @@
         </p:nvSpPr>
         <p:spPr>
           <a:xfrm>
-            <a:off x="1448680" y="1266702"/>
+            <a:off x="1582904" y="1308647"/>
             <a:ext cx="3562852" cy="1568509"/>
           </a:xfrm>
           <a:prstGeom prst="rect">
@@ -3579,7 +3579,7 @@
         </p:nvSpPr>
         <p:spPr>
           <a:xfrm>
-            <a:off x="3424081" y="4186832"/>
+            <a:off x="3558305" y="4228777"/>
             <a:ext cx="2022842" cy="1751332"/>
           </a:xfrm>
           <a:prstGeom prst="rect">
@@ -3653,7 +3653,7 @@
         </p:nvSpPr>
         <p:spPr>
           <a:xfrm>
-            <a:off x="3175891" y="4010006"/>
+            <a:off x="3310115" y="4051951"/>
             <a:ext cx="977590" cy="378043"/>
           </a:xfrm>
           <a:custGeom>
@@ -3803,7 +3803,7 @@
         </p:nvSpPr>
         <p:spPr>
           <a:xfrm>
-            <a:off x="5852956" y="4201119"/>
+            <a:off x="5987180" y="4243064"/>
             <a:ext cx="2022842" cy="1733816"/>
           </a:xfrm>
           <a:prstGeom prst="rect">
@@ -3877,7 +3877,7 @@
         </p:nvSpPr>
         <p:spPr>
           <a:xfrm>
-            <a:off x="5576191" y="4024293"/>
+            <a:off x="5710415" y="4066238"/>
             <a:ext cx="977590" cy="378043"/>
           </a:xfrm>
           <a:custGeom>
@@ -4027,7 +4027,7 @@
         </p:nvSpPr>
         <p:spPr>
           <a:xfrm>
-            <a:off x="1022633" y="1189219"/>
+            <a:off x="1156857" y="1231164"/>
             <a:ext cx="1218045" cy="378043"/>
           </a:xfrm>
           <a:custGeom>
@@ -4175,7 +4175,7 @@
         </p:nvSpPr>
         <p:spPr>
           <a:xfrm>
-            <a:off x="1448681" y="2959240"/>
+            <a:off x="1582905" y="3001185"/>
             <a:ext cx="5954407" cy="747797"/>
           </a:xfrm>
           <a:prstGeom prst="rect">
@@ -4249,7 +4249,7 @@
         </p:nvSpPr>
         <p:spPr>
           <a:xfrm>
-            <a:off x="1022633" y="2943106"/>
+            <a:off x="1156857" y="2985051"/>
             <a:ext cx="1168576" cy="378043"/>
           </a:xfrm>
           <a:custGeom>
@@ -4397,7 +4397,7 @@
         </p:nvSpPr>
         <p:spPr>
           <a:xfrm>
-            <a:off x="5131845" y="1266703"/>
+            <a:off x="5266069" y="1308648"/>
             <a:ext cx="2271240" cy="1582028"/>
           </a:xfrm>
           <a:prstGeom prst="rect">
@@ -4485,7 +4485,7 @@
         </p:blipFill>
         <p:spPr>
           <a:xfrm>
-            <a:off x="4735379" y="3942622"/>
+            <a:off x="4869603" y="3984567"/>
             <a:ext cx="229222" cy="469070"/>
           </a:xfrm>
           <a:prstGeom prst="rect">
@@ -4521,7 +4521,7 @@
         </p:blipFill>
         <p:spPr>
           <a:xfrm flipH="1">
-            <a:off x="4124699" y="1032885"/>
+            <a:off x="4258923" y="1074830"/>
             <a:ext cx="248352" cy="512777"/>
           </a:xfrm>
           <a:prstGeom prst="rect">
@@ -4543,7 +4543,7 @@
         </p:nvSpPr>
         <p:spPr>
           <a:xfrm>
-            <a:off x="4864897" y="1159142"/>
+            <a:off x="4999121" y="1201087"/>
             <a:ext cx="1419047" cy="378043"/>
           </a:xfrm>
           <a:custGeom>
@@ -4691,7 +4691,7 @@
         </p:nvSpPr>
         <p:spPr>
           <a:xfrm>
-            <a:off x="5941112" y="4802035"/>
+            <a:off x="6075336" y="4843980"/>
             <a:ext cx="1840594" cy="273593"/>
           </a:xfrm>
           <a:prstGeom prst="rect">
@@ -4775,7 +4775,7 @@
         </p:nvSpPr>
         <p:spPr>
           <a:xfrm>
-            <a:off x="3470559" y="4443969"/>
+            <a:off x="3604783" y="4485914"/>
             <a:ext cx="1853665" cy="309355"/>
           </a:xfrm>
           <a:prstGeom prst="rect">
@@ -4843,7 +4843,7 @@
         </p:nvSpPr>
         <p:spPr>
           <a:xfrm>
-            <a:off x="1506313" y="1832755"/>
+            <a:off x="1640537" y="1874700"/>
             <a:ext cx="857666" cy="897579"/>
           </a:xfrm>
           <a:prstGeom prst="rect">
@@ -4974,7 +4974,7 @@
         </p:nvSpPr>
         <p:spPr>
           <a:xfrm>
-            <a:off x="4038033" y="839740"/>
+            <a:off x="4172257" y="881685"/>
             <a:ext cx="740206" cy="224365"/>
           </a:xfrm>
           <a:prstGeom prst="rect">
@@ -5069,7 +5069,7 @@
         </p:nvSpPr>
         <p:spPr>
           <a:xfrm>
-            <a:off x="5261216" y="1855841"/>
+            <a:off x="5395440" y="1897786"/>
             <a:ext cx="567000" cy="540000"/>
           </a:xfrm>
           <a:prstGeom prst="ellipse">
@@ -5150,7 +5150,7 @@
         </p:nvSpPr>
         <p:spPr>
           <a:xfrm>
-            <a:off x="5686970" y="2273395"/>
+            <a:off x="5821194" y="2315340"/>
             <a:ext cx="567000" cy="540000"/>
           </a:xfrm>
           <a:prstGeom prst="ellipse">
@@ -5233,7 +5233,7 @@
         </p:nvSpPr>
         <p:spPr>
           <a:xfrm>
-            <a:off x="6553781" y="2267256"/>
+            <a:off x="6688005" y="2309201"/>
             <a:ext cx="567000" cy="540000"/>
           </a:xfrm>
           <a:prstGeom prst="ellipse">
@@ -5315,7 +5315,7 @@
         </p:nvSpPr>
         <p:spPr>
           <a:xfrm>
-            <a:off x="6123561" y="1846504"/>
+            <a:off x="6257785" y="1888449"/>
             <a:ext cx="567000" cy="540000"/>
           </a:xfrm>
           <a:prstGeom prst="ellipse">
@@ -5405,7 +5405,7 @@
         </p:nvSpPr>
         <p:spPr>
           <a:xfrm>
-            <a:off x="3519265" y="4834773"/>
+            <a:off x="3653489" y="4876718"/>
             <a:ext cx="1039403" cy="309355"/>
           </a:xfrm>
           <a:prstGeom prst="rect">
@@ -5489,7 +5489,7 @@
         </p:nvSpPr>
         <p:spPr>
           <a:xfrm>
-            <a:off x="3519265" y="5213391"/>
+            <a:off x="3653489" y="5255336"/>
             <a:ext cx="1039403" cy="309355"/>
           </a:xfrm>
           <a:prstGeom prst="rect">
@@ -5587,7 +5587,7 @@
         </p:blipFill>
         <p:spPr>
           <a:xfrm>
-            <a:off x="5072981" y="3934387"/>
+            <a:off x="5207205" y="3976332"/>
             <a:ext cx="229222" cy="477305"/>
           </a:xfrm>
           <a:prstGeom prst="rect">
@@ -5623,7 +5623,7 @@
         </p:blipFill>
         <p:spPr>
           <a:xfrm>
-            <a:off x="2122390" y="3950205"/>
+            <a:off x="2256614" y="3992150"/>
             <a:ext cx="229007" cy="468631"/>
           </a:xfrm>
           <a:prstGeom prst="rect">
@@ -5645,7 +5645,7 @@
         </p:nvSpPr>
         <p:spPr>
           <a:xfrm>
-            <a:off x="1098832" y="4443968"/>
+            <a:off x="1233056" y="4485913"/>
             <a:ext cx="1853665" cy="309355"/>
           </a:xfrm>
           <a:prstGeom prst="rect">
@@ -5742,7 +5742,7 @@
         </p:nvSpPr>
         <p:spPr>
           <a:xfrm>
-            <a:off x="1140394" y="4834771"/>
+            <a:off x="1274618" y="4876716"/>
             <a:ext cx="1039403" cy="309355"/>
           </a:xfrm>
           <a:prstGeom prst="rect">
@@ -5826,7 +5826,7 @@
         </p:nvSpPr>
         <p:spPr>
           <a:xfrm>
-            <a:off x="1140394" y="5213390"/>
+            <a:off x="1274618" y="5255335"/>
             <a:ext cx="1039403" cy="309355"/>
           </a:xfrm>
           <a:prstGeom prst="rect">
@@ -5910,7 +5910,7 @@
         </p:nvSpPr>
         <p:spPr>
           <a:xfrm>
-            <a:off x="2240679" y="4834772"/>
+            <a:off x="2374903" y="4876717"/>
             <a:ext cx="747539" cy="687974"/>
           </a:xfrm>
           <a:prstGeom prst="rect">
@@ -6014,7 +6014,7 @@
         </p:nvSpPr>
         <p:spPr>
           <a:xfrm>
-            <a:off x="5872365" y="4443971"/>
+            <a:off x="6006589" y="4485916"/>
             <a:ext cx="1853665" cy="309355"/>
           </a:xfrm>
           <a:prstGeom prst="rect">
@@ -6125,7 +6125,7 @@
         </p:blipFill>
         <p:spPr>
           <a:xfrm>
-            <a:off x="7488190" y="3934388"/>
+            <a:off x="7622414" y="3976333"/>
             <a:ext cx="229222" cy="468631"/>
           </a:xfrm>
           <a:prstGeom prst="rect">
@@ -6161,7 +6161,7 @@
         </p:blipFill>
         <p:spPr>
           <a:xfrm>
-            <a:off x="2435091" y="3949766"/>
+            <a:off x="2569315" y="3991711"/>
             <a:ext cx="229222" cy="469070"/>
           </a:xfrm>
           <a:prstGeom prst="rect">
@@ -6197,7 +6197,7 @@
         </p:blipFill>
         <p:spPr>
           <a:xfrm>
-            <a:off x="2736974" y="3941532"/>
+            <a:off x="2871198" y="3983477"/>
             <a:ext cx="229222" cy="477305"/>
           </a:xfrm>
           <a:prstGeom prst="rect">
@@ -6219,7 +6219,7 @@
         </p:nvSpPr>
         <p:spPr>
           <a:xfrm>
-            <a:off x="4622392" y="4805669"/>
+            <a:off x="4756616" y="4847614"/>
             <a:ext cx="432000" cy="405000"/>
           </a:xfrm>
           <a:prstGeom prst="ellipse">
@@ -6296,7 +6296,7 @@
         </p:nvSpPr>
         <p:spPr>
           <a:xfrm>
-            <a:off x="4958708" y="5142576"/>
+            <a:off x="5092932" y="5184521"/>
             <a:ext cx="432000" cy="405000"/>
           </a:xfrm>
           <a:prstGeom prst="ellipse">
@@ -6371,7 +6371,7 @@
         </p:nvSpPr>
         <p:spPr>
           <a:xfrm>
-            <a:off x="3450633" y="4443971"/>
+            <a:off x="3584857" y="4485916"/>
             <a:ext cx="1853665" cy="309355"/>
           </a:xfrm>
           <a:prstGeom prst="rect">
@@ -6468,7 +6468,7 @@
         </p:nvSpPr>
         <p:spPr>
           <a:xfrm>
-            <a:off x="7421611" y="3751393"/>
+            <a:off x="7555835" y="3793338"/>
             <a:ext cx="422231" cy="187768"/>
           </a:xfrm>
           <a:prstGeom prst="rect">
@@ -6552,7 +6552,7 @@
         </p:nvSpPr>
         <p:spPr>
           <a:xfrm>
-            <a:off x="4999879" y="3758537"/>
+            <a:off x="5134103" y="3800482"/>
             <a:ext cx="422231" cy="187768"/>
           </a:xfrm>
           <a:prstGeom prst="rect">
@@ -6636,7 +6636,7 @@
         </p:nvSpPr>
         <p:spPr>
           <a:xfrm>
-            <a:off x="4628403" y="3758537"/>
+            <a:off x="4762627" y="3800482"/>
             <a:ext cx="503444" cy="187768"/>
           </a:xfrm>
           <a:prstGeom prst="rect">
@@ -6718,7 +6718,7 @@
         </p:nvSpPr>
         <p:spPr>
           <a:xfrm>
-            <a:off x="2049511" y="3751393"/>
+            <a:off x="2183735" y="3793338"/>
             <a:ext cx="422231" cy="187768"/>
           </a:xfrm>
           <a:prstGeom prst="rect">
@@ -6796,7 +6796,7 @@
         </p:nvSpPr>
         <p:spPr>
           <a:xfrm>
-            <a:off x="2663872" y="3751393"/>
+            <a:off x="2798096" y="3793338"/>
             <a:ext cx="422231" cy="187768"/>
           </a:xfrm>
           <a:prstGeom prst="rect">
@@ -6880,7 +6880,7 @@
         </p:nvSpPr>
         <p:spPr>
           <a:xfrm>
-            <a:off x="2335260" y="3751393"/>
+            <a:off x="2469484" y="3793338"/>
             <a:ext cx="503444" cy="187768"/>
           </a:xfrm>
           <a:prstGeom prst="rect">
@@ -6964,7 +6964,7 @@
         </p:nvCxnSpPr>
         <p:spPr>
           <a:xfrm rot="10800000">
-            <a:off x="1483363" y="2316671"/>
+            <a:off x="1617587" y="2358616"/>
             <a:ext cx="4509377" cy="3448335"/>
           </a:xfrm>
           <a:prstGeom prst="bentConnector3">
@@ -7017,7 +7017,7 @@
         </p:nvSpPr>
         <p:spPr>
           <a:xfrm>
-            <a:off x="1140394" y="5609130"/>
+            <a:off x="1274618" y="5651075"/>
             <a:ext cx="1847822" cy="282124"/>
           </a:xfrm>
           <a:prstGeom prst="rect">
@@ -7104,7 +7104,7 @@
         </p:blipFill>
         <p:spPr>
           <a:xfrm flipH="1">
-            <a:off x="4431881" y="1032885"/>
+            <a:off x="4566105" y="1074830"/>
             <a:ext cx="248352" cy="512777"/>
           </a:xfrm>
           <a:prstGeom prst="rect">
@@ -7126,7 +7126,7 @@
         </p:nvSpPr>
         <p:spPr>
           <a:xfrm>
-            <a:off x="6886369" y="5147675"/>
+            <a:off x="7020593" y="5189620"/>
             <a:ext cx="432000" cy="405000"/>
           </a:xfrm>
           <a:prstGeom prst="ellipse">
@@ -7203,7 +7203,7 @@
         </p:nvSpPr>
         <p:spPr>
           <a:xfrm>
-            <a:off x="7360915" y="5142258"/>
+            <a:off x="7495139" y="5184203"/>
             <a:ext cx="432000" cy="405000"/>
           </a:xfrm>
           <a:prstGeom prst="ellipse">
@@ -7278,7 +7278,7 @@
         </p:nvSpPr>
         <p:spPr>
           <a:xfrm>
-            <a:off x="5931211" y="5160695"/>
+            <a:off x="6065435" y="5202640"/>
             <a:ext cx="432000" cy="405000"/>
           </a:xfrm>
           <a:prstGeom prst="ellipse">
@@ -7353,7 +7353,7 @@
         </p:nvSpPr>
         <p:spPr>
           <a:xfrm>
-            <a:off x="6411959" y="5148136"/>
+            <a:off x="6546183" y="5190081"/>
             <a:ext cx="432000" cy="405000"/>
           </a:xfrm>
           <a:prstGeom prst="ellipse">
@@ -7437,7 +7437,7 @@
         </p:nvSpPr>
         <p:spPr>
           <a:xfrm>
-            <a:off x="4483683" y="2835210"/>
+            <a:off x="4617907" y="2877155"/>
             <a:ext cx="289513" cy="969008"/>
           </a:xfrm>
           <a:prstGeom prst="uturnArrow">
@@ -7506,7 +7506,7 @@
         </p:nvSpPr>
         <p:spPr>
           <a:xfrm>
-            <a:off x="4093826" y="3189205"/>
+            <a:off x="4228050" y="3231150"/>
             <a:ext cx="1485000" cy="414923"/>
           </a:xfrm>
           <a:prstGeom prst="rect">
@@ -7590,7 +7590,7 @@
         </p:nvSpPr>
         <p:spPr>
           <a:xfrm>
-            <a:off x="6304178" y="2857791"/>
+            <a:off x="6438402" y="2899736"/>
             <a:ext cx="279932" cy="944521"/>
           </a:xfrm>
           <a:prstGeom prst="uturnArrow">
@@ -7659,7 +7659,7 @@
         </p:nvSpPr>
         <p:spPr>
           <a:xfrm>
-            <a:off x="5747096" y="3189135"/>
+            <a:off x="5881320" y="3231080"/>
             <a:ext cx="1485000" cy="414923"/>
           </a:xfrm>
           <a:prstGeom prst="rect">
@@ -7757,7 +7757,7 @@
         </p:blipFill>
         <p:spPr>
           <a:xfrm flipH="1">
-            <a:off x="6735556" y="1038901"/>
+            <a:off x="6869780" y="1080846"/>
             <a:ext cx="248352" cy="512777"/>
           </a:xfrm>
           <a:prstGeom prst="rect">
@@ -7793,7 +7793,7 @@
         </p:blipFill>
         <p:spPr>
           <a:xfrm flipH="1">
-            <a:off x="7042737" y="1038901"/>
+            <a:off x="7176961" y="1080846"/>
             <a:ext cx="248352" cy="512777"/>
           </a:xfrm>
           <a:prstGeom prst="rect">
@@ -7815,7 +7815,7 @@
         </p:nvSpPr>
         <p:spPr>
           <a:xfrm>
-            <a:off x="6642876" y="839741"/>
+            <a:off x="6777100" y="881686"/>
             <a:ext cx="740206" cy="224365"/>
           </a:xfrm>
           <a:prstGeom prst="rect">
@@ -7910,7 +7910,7 @@
         </p:nvSpPr>
         <p:spPr>
           <a:xfrm>
-            <a:off x="1456729" y="1589765"/>
+            <a:off x="1590953" y="1631710"/>
             <a:ext cx="3128811" cy="309355"/>
           </a:xfrm>
           <a:prstGeom prst="rect">
@@ -7988,7 +7988,7 @@
         </p:nvSpPr>
         <p:spPr>
           <a:xfrm>
-            <a:off x="2402177" y="1832755"/>
+            <a:off x="2536401" y="1874700"/>
             <a:ext cx="826701" cy="897579"/>
           </a:xfrm>
           <a:prstGeom prst="rect">
@@ -8100,7 +8100,7 @@
         </p:nvSpPr>
         <p:spPr>
           <a:xfrm>
-            <a:off x="3268499" y="1832755"/>
+            <a:off x="3402723" y="1874700"/>
             <a:ext cx="826701" cy="897579"/>
           </a:xfrm>
           <a:prstGeom prst="rect">
@@ -8210,7 +8210,7 @@
         </p:nvSpPr>
         <p:spPr>
           <a:xfrm>
-            <a:off x="4134767" y="1832756"/>
+            <a:off x="4268991" y="1874701"/>
             <a:ext cx="826701" cy="897579"/>
           </a:xfrm>
           <a:prstGeom prst="rect">
@@ -8333,7 +8333,7 @@
         </p:nvSpPr>
         <p:spPr>
           <a:xfrm>
-            <a:off x="1545661" y="1832757"/>
+            <a:off x="1679885" y="1874702"/>
             <a:ext cx="783083" cy="276476"/>
           </a:xfrm>
           <a:prstGeom prst="ellipse">
@@ -8396,7 +8396,7 @@
         </p:nvSpPr>
         <p:spPr>
           <a:xfrm>
-            <a:off x="2402911" y="1832757"/>
+            <a:off x="2537135" y="1874702"/>
             <a:ext cx="872837" cy="276476"/>
           </a:xfrm>
           <a:prstGeom prst="ellipse">
@@ -8459,7 +8459,7 @@
         </p:nvSpPr>
         <p:spPr>
           <a:xfrm>
-            <a:off x="4153131" y="1832757"/>
+            <a:off x="4287355" y="1874702"/>
             <a:ext cx="783083" cy="276476"/>
           </a:xfrm>
           <a:prstGeom prst="ellipse">
@@ -8522,7 +8522,7 @@
         </p:nvSpPr>
         <p:spPr>
           <a:xfrm>
-            <a:off x="3295881" y="1832757"/>
+            <a:off x="3430105" y="1874702"/>
             <a:ext cx="783083" cy="276476"/>
           </a:xfrm>
           <a:prstGeom prst="ellipse">
@@ -8585,7 +8585,7 @@
         </p:nvSpPr>
         <p:spPr>
           <a:xfrm>
-            <a:off x="6974935" y="1912583"/>
+            <a:off x="7109159" y="1954528"/>
             <a:ext cx="351875" cy="338894"/>
           </a:xfrm>
           <a:prstGeom prst="ellipse">
@@ -8669,7 +8669,7 @@
         </p:nvSpPr>
         <p:spPr>
           <a:xfrm>
-            <a:off x="5171480" y="1589762"/>
+            <a:off x="5305704" y="1631707"/>
             <a:ext cx="1812430" cy="240540"/>
           </a:xfrm>
           <a:prstGeom prst="rect">
@@ -8764,7 +8764,7 @@
         </p:blipFill>
         <p:spPr>
           <a:xfrm flipH="1">
-            <a:off x="5838101" y="3300473"/>
+            <a:off x="5972325" y="3342418"/>
             <a:ext cx="168483" cy="164248"/>
           </a:xfrm>
           <a:prstGeom prst="rect">
@@ -8800,7 +8800,7 @@
         </p:blipFill>
         <p:spPr>
           <a:xfrm>
-            <a:off x="4242780" y="3244456"/>
+            <a:off x="4377004" y="3286401"/>
             <a:ext cx="248135" cy="248135"/>
           </a:xfrm>
           <a:prstGeom prst="rect">
@@ -8822,7 +8822,7 @@
         </p:nvSpPr>
         <p:spPr>
           <a:xfrm>
-            <a:off x="6584108" y="2905856"/>
+            <a:off x="6718332" y="2947801"/>
             <a:ext cx="1208853" cy="198208"/>
           </a:xfrm>
           <a:prstGeom prst="wedgeEllipseCallout">
@@ -8886,7 +8886,7 @@
         </p:nvSpPr>
         <p:spPr>
           <a:xfrm>
-            <a:off x="6719315" y="2892872"/>
+            <a:off x="6853539" y="2934817"/>
             <a:ext cx="1136025" cy="222859"/>
           </a:xfrm>
           <a:prstGeom prst="rect">
@@ -8961,7 +8961,7 @@
         </p:nvSpPr>
         <p:spPr>
           <a:xfrm>
-            <a:off x="4783883" y="2898712"/>
+            <a:off x="4918107" y="2940657"/>
             <a:ext cx="1208853" cy="198208"/>
           </a:xfrm>
           <a:prstGeom prst="wedgeEllipseCallout">
@@ -9025,7 +9025,7 @@
         </p:nvSpPr>
         <p:spPr>
           <a:xfrm>
-            <a:off x="4919090" y="2885727"/>
+            <a:off x="5053314" y="2927672"/>
             <a:ext cx="1136025" cy="222859"/>
           </a:xfrm>
           <a:prstGeom prst="rect">
@@ -9100,7 +9100,7 @@
         </p:nvSpPr>
         <p:spPr>
           <a:xfrm>
-            <a:off x="3036742" y="2835210"/>
+            <a:off x="3170966" y="2877155"/>
             <a:ext cx="281757" cy="969008"/>
           </a:xfrm>
           <a:prstGeom prst="uturnArrow">
@@ -9169,7 +9169,7 @@
         </p:nvSpPr>
         <p:spPr>
           <a:xfrm>
-            <a:off x="3303308" y="2898712"/>
+            <a:off x="3437532" y="2940657"/>
             <a:ext cx="1035678" cy="198208"/>
           </a:xfrm>
           <a:prstGeom prst="wedgeEllipseCallout">
@@ -9233,7 +9233,7 @@
         </p:nvSpPr>
         <p:spPr>
           <a:xfrm>
-            <a:off x="3424228" y="2885727"/>
+            <a:off x="3558452" y="2927672"/>
             <a:ext cx="1136025" cy="222859"/>
           </a:xfrm>
           <a:prstGeom prst="rect">
@@ -9308,7 +9308,7 @@
         </p:nvSpPr>
         <p:spPr>
           <a:xfrm>
-            <a:off x="2433398" y="3189135"/>
+            <a:off x="2567622" y="3231080"/>
             <a:ext cx="1485000" cy="414923"/>
           </a:xfrm>
           <a:prstGeom prst="rect">
@@ -9409,7 +9409,7 @@
         </p:blipFill>
         <p:spPr>
           <a:xfrm>
-            <a:off x="2530908" y="3288009"/>
+            <a:off x="2665132" y="3329954"/>
             <a:ext cx="212401" cy="212401"/>
           </a:xfrm>
           <a:prstGeom prst="rect">
@@ -9431,7 +9431,7 @@
         </p:nvSpPr>
         <p:spPr>
           <a:xfrm rot="16200000">
-            <a:off x="-429827" y="3449721"/>
+            <a:off x="-295603" y="3491666"/>
             <a:ext cx="1853665" cy="309355"/>
           </a:xfrm>
           <a:prstGeom prst="rect">
@@ -9509,7 +9509,7 @@
         </p:nvSpPr>
         <p:spPr>
           <a:xfrm>
-            <a:off x="1140394" y="5623544"/>
+            <a:off x="1274618" y="5665489"/>
             <a:ext cx="1847822" cy="267708"/>
           </a:xfrm>
           <a:custGeom>
@@ -9657,7 +9657,7 @@
         </p:nvSpPr>
         <p:spPr>
           <a:xfrm>
-            <a:off x="3526902" y="5623919"/>
+            <a:off x="3661126" y="5665864"/>
             <a:ext cx="1847822" cy="267708"/>
           </a:xfrm>
           <a:custGeom>
@@ -9805,7 +9805,7 @@
         </p:nvSpPr>
         <p:spPr>
           <a:xfrm>
-            <a:off x="5962460" y="5631770"/>
+            <a:off x="6096684" y="5673715"/>
             <a:ext cx="1847822" cy="267708"/>
           </a:xfrm>
           <a:custGeom>
@@ -13939,8 +13939,8 @@
         </p:nvSpPr>
         <p:spPr>
           <a:xfrm>
-            <a:off x="586483" y="3303560"/>
-            <a:ext cx="1027053" cy="2184989"/>
+            <a:off x="516771" y="3303560"/>
+            <a:ext cx="1096766" cy="2184989"/>
           </a:xfrm>
           <a:prstGeom prst="homePlate">
             <a:avLst>
@@ -14099,8 +14099,8 @@
         </p:nvSpPr>
         <p:spPr>
           <a:xfrm>
-            <a:off x="591149" y="1558464"/>
-            <a:ext cx="1027053" cy="1668794"/>
+            <a:off x="521435" y="1558464"/>
+            <a:ext cx="1096767" cy="1668794"/>
           </a:xfrm>
           <a:prstGeom prst="homePlate">
             <a:avLst>

</xml_diff>